<commit_message>
creative needed to create a video and presentation
</commit_message>
<xml_diff>
--- a/Creative/Ulster Bank Hackathon Pitch Deck.pptx
+++ b/Creative/Ulster Bank Hackathon Pitch Deck.pptx
@@ -4,6 +4,9 @@
   <p:sldMasterIdLst>
     <p:sldMasterId id="2147483648" r:id="rId1"/>
   </p:sldMasterIdLst>
+  <p:notesMasterIdLst>
+    <p:notesMasterId r:id="rId9"/>
+  </p:notesMasterIdLst>
   <p:sldIdLst>
     <p:sldId id="256" r:id="rId2"/>
     <p:sldId id="262" r:id="rId3"/>
@@ -110,6 +113,11 @@
       </a:defRPr>
     </a:lvl9pPr>
   </p:defaultTextStyle>
+  <p:extLst>
+    <p:ext uri="{EFAFB233-063F-42B5-8137-9DF3F51BA10A}">
+      <p15:sldGuideLst xmlns:p15="http://schemas.microsoft.com/office/powerpoint/2012/main"/>
+    </p:ext>
+  </p:extLst>
 </p:presentation>
 </file>
 
@@ -117,6 +125,7 @@
 <p1510:revInfo xmlns:a="http://schemas.openxmlformats.org/drawingml/2006/main" xmlns:r="http://schemas.openxmlformats.org/officeDocument/2006/relationships" xmlns:p1510="http://schemas.microsoft.com/office/powerpoint/2015/10/main">
   <p1510:revLst>
     <p1510:client id="{4432F80D-0742-43E0-8906-C44F27F7BDEE}" v="75" dt="2020-09-25T23:15:03.071"/>
+    <p1510:client id="{7BA73EB4-5371-48EF-B04E-D19F43DADD9A}" v="14" dt="2020-09-26T01:14:23.281"/>
   </p1510:revLst>
 </p1510:revInfo>
 </file>
@@ -669,7 +678,1230 @@
       </pc:sldChg>
     </pc:docChg>
   </pc:docChgLst>
+  <pc:docChgLst>
+    <pc:chgData name="Jerry Overton" userId="779cb000fa64fafa" providerId="LiveId" clId="{7BA73EB4-5371-48EF-B04E-D19F43DADD9A}"/>
+    <pc:docChg chg="custSel modSld">
+      <pc:chgData name="Jerry Overton" userId="779cb000fa64fafa" providerId="LiveId" clId="{7BA73EB4-5371-48EF-B04E-D19F43DADD9A}" dt="2020-09-26T01:26:35.310" v="3071" actId="20577"/>
+      <pc:docMkLst>
+        <pc:docMk/>
+      </pc:docMkLst>
+      <pc:sldChg chg="addSp modSp modNotesTx">
+        <pc:chgData name="Jerry Overton" userId="779cb000fa64fafa" providerId="LiveId" clId="{7BA73EB4-5371-48EF-B04E-D19F43DADD9A}" dt="2020-09-26T01:14:49.027" v="2923" actId="6549"/>
+        <pc:sldMkLst>
+          <pc:docMk/>
+          <pc:sldMk cId="4257234936" sldId="256"/>
+        </pc:sldMkLst>
+        <pc:spChg chg="add mod">
+          <ac:chgData name="Jerry Overton" userId="779cb000fa64fafa" providerId="LiveId" clId="{7BA73EB4-5371-48EF-B04E-D19F43DADD9A}" dt="2020-09-26T01:14:49.027" v="2923" actId="6549"/>
+          <ac:spMkLst>
+            <pc:docMk/>
+            <pc:sldMk cId="4257234936" sldId="256"/>
+            <ac:spMk id="12" creationId="{698BE9F2-07D8-4756-9BD2-CA4DB5C2C1EA}"/>
+          </ac:spMkLst>
+        </pc:spChg>
+      </pc:sldChg>
+      <pc:sldChg chg="addSp modSp modNotesTx">
+        <pc:chgData name="Jerry Overton" userId="779cb000fa64fafa" providerId="LiveId" clId="{7BA73EB4-5371-48EF-B04E-D19F43DADD9A}" dt="2020-09-26T01:17:39.168" v="2991" actId="20577"/>
+        <pc:sldMkLst>
+          <pc:docMk/>
+          <pc:sldMk cId="4050038750" sldId="257"/>
+        </pc:sldMkLst>
+        <pc:spChg chg="mod">
+          <ac:chgData name="Jerry Overton" userId="779cb000fa64fafa" providerId="LiveId" clId="{7BA73EB4-5371-48EF-B04E-D19F43DADD9A}" dt="2020-09-26T01:13:03.863" v="2619" actId="1076"/>
+          <ac:spMkLst>
+            <pc:docMk/>
+            <pc:sldMk cId="4050038750" sldId="257"/>
+            <ac:spMk id="4" creationId="{015FA106-7A4D-46D3-9095-A417B5EE0630}"/>
+          </ac:spMkLst>
+        </pc:spChg>
+        <pc:spChg chg="add mod">
+          <ac:chgData name="Jerry Overton" userId="779cb000fa64fafa" providerId="LiveId" clId="{7BA73EB4-5371-48EF-B04E-D19F43DADD9A}" dt="2020-09-26T01:17:39.168" v="2991" actId="20577"/>
+          <ac:spMkLst>
+            <pc:docMk/>
+            <pc:sldMk cId="4050038750" sldId="257"/>
+            <ac:spMk id="29" creationId="{C8A8B21C-D6D9-436F-9421-2A1C8CFB6E2B}"/>
+          </ac:spMkLst>
+        </pc:spChg>
+      </pc:sldChg>
+      <pc:sldChg chg="addSp modSp modNotesTx">
+        <pc:chgData name="Jerry Overton" userId="779cb000fa64fafa" providerId="LiveId" clId="{7BA73EB4-5371-48EF-B04E-D19F43DADD9A}" dt="2020-09-26T01:12:59.094" v="2618" actId="20577"/>
+        <pc:sldMkLst>
+          <pc:docMk/>
+          <pc:sldMk cId="462357739" sldId="258"/>
+        </pc:sldMkLst>
+        <pc:spChg chg="mod">
+          <ac:chgData name="Jerry Overton" userId="779cb000fa64fafa" providerId="LiveId" clId="{7BA73EB4-5371-48EF-B04E-D19F43DADD9A}" dt="2020-09-26T00:54:03.715" v="1222" actId="20577"/>
+          <ac:spMkLst>
+            <pc:docMk/>
+            <pc:sldMk cId="462357739" sldId="258"/>
+            <ac:spMk id="2" creationId="{670999D2-396D-4406-98F7-B7BF73582FDB}"/>
+          </ac:spMkLst>
+        </pc:spChg>
+        <pc:spChg chg="mod">
+          <ac:chgData name="Jerry Overton" userId="779cb000fa64fafa" providerId="LiveId" clId="{7BA73EB4-5371-48EF-B04E-D19F43DADD9A}" dt="2020-09-26T00:54:58.796" v="1255" actId="20577"/>
+          <ac:spMkLst>
+            <pc:docMk/>
+            <pc:sldMk cId="462357739" sldId="258"/>
+            <ac:spMk id="9" creationId="{9BB66CFD-DD60-42FF-A353-E094DBBBEDD6}"/>
+          </ac:spMkLst>
+        </pc:spChg>
+        <pc:spChg chg="mod">
+          <ac:chgData name="Jerry Overton" userId="779cb000fa64fafa" providerId="LiveId" clId="{7BA73EB4-5371-48EF-B04E-D19F43DADD9A}" dt="2020-09-26T00:54:47.615" v="1249" actId="20577"/>
+          <ac:spMkLst>
+            <pc:docMk/>
+            <pc:sldMk cId="462357739" sldId="258"/>
+            <ac:spMk id="10" creationId="{5679F181-73BA-4746-B9AC-A5EA12C17543}"/>
+          </ac:spMkLst>
+        </pc:spChg>
+        <pc:spChg chg="mod">
+          <ac:chgData name="Jerry Overton" userId="779cb000fa64fafa" providerId="LiveId" clId="{7BA73EB4-5371-48EF-B04E-D19F43DADD9A}" dt="2020-09-26T00:54:31.216" v="1242" actId="20577"/>
+          <ac:spMkLst>
+            <pc:docMk/>
+            <pc:sldMk cId="462357739" sldId="258"/>
+            <ac:spMk id="11" creationId="{802BD554-DC4E-4FB6-9CE6-1DDF1C88A2B4}"/>
+          </ac:spMkLst>
+        </pc:spChg>
+        <pc:spChg chg="add mod">
+          <ac:chgData name="Jerry Overton" userId="779cb000fa64fafa" providerId="LiveId" clId="{7BA73EB4-5371-48EF-B04E-D19F43DADD9A}" dt="2020-09-26T01:12:59.094" v="2618" actId="20577"/>
+          <ac:spMkLst>
+            <pc:docMk/>
+            <pc:sldMk cId="462357739" sldId="258"/>
+            <ac:spMk id="23" creationId="{BD07FB79-58B4-44EE-93C5-540C94DEA6B4}"/>
+          </ac:spMkLst>
+        </pc:spChg>
+      </pc:sldChg>
+      <pc:sldChg chg="modNotesTx">
+        <pc:chgData name="Jerry Overton" userId="779cb000fa64fafa" providerId="LiveId" clId="{7BA73EB4-5371-48EF-B04E-D19F43DADD9A}" dt="2020-09-26T01:01:53.375" v="1722" actId="20577"/>
+        <pc:sldMkLst>
+          <pc:docMk/>
+          <pc:sldMk cId="3084827524" sldId="259"/>
+        </pc:sldMkLst>
+      </pc:sldChg>
+      <pc:sldChg chg="modNotesTx">
+        <pc:chgData name="Jerry Overton" userId="779cb000fa64fafa" providerId="LiveId" clId="{7BA73EB4-5371-48EF-B04E-D19F43DADD9A}" dt="2020-09-26T01:26:35.310" v="3071" actId="20577"/>
+        <pc:sldMkLst>
+          <pc:docMk/>
+          <pc:sldMk cId="1011350845" sldId="260"/>
+        </pc:sldMkLst>
+      </pc:sldChg>
+      <pc:sldChg chg="addSp modSp modNotesTx">
+        <pc:chgData name="Jerry Overton" userId="779cb000fa64fafa" providerId="LiveId" clId="{7BA73EB4-5371-48EF-B04E-D19F43DADD9A}" dt="2020-09-26T01:21:04.310" v="3055" actId="6549"/>
+        <pc:sldMkLst>
+          <pc:docMk/>
+          <pc:sldMk cId="1824903989" sldId="261"/>
+        </pc:sldMkLst>
+        <pc:spChg chg="add mod">
+          <ac:chgData name="Jerry Overton" userId="779cb000fa64fafa" providerId="LiveId" clId="{7BA73EB4-5371-48EF-B04E-D19F43DADD9A}" dt="2020-09-26T01:12:16.285" v="2511" actId="207"/>
+          <ac:spMkLst>
+            <pc:docMk/>
+            <pc:sldMk cId="1824903989" sldId="261"/>
+            <ac:spMk id="3" creationId="{D0388801-5BC5-41E1-AA89-152332E68720}"/>
+          </ac:spMkLst>
+        </pc:spChg>
+      </pc:sldChg>
+      <pc:sldChg chg="addSp modSp modNotesTx">
+        <pc:chgData name="Jerry Overton" userId="779cb000fa64fafa" providerId="LiveId" clId="{7BA73EB4-5371-48EF-B04E-D19F43DADD9A}" dt="2020-09-26T01:14:05.215" v="2795" actId="20577"/>
+        <pc:sldMkLst>
+          <pc:docMk/>
+          <pc:sldMk cId="933063407" sldId="262"/>
+        </pc:sldMkLst>
+        <pc:spChg chg="add mod">
+          <ac:chgData name="Jerry Overton" userId="779cb000fa64fafa" providerId="LiveId" clId="{7BA73EB4-5371-48EF-B04E-D19F43DADD9A}" dt="2020-09-26T01:14:05.215" v="2795" actId="20577"/>
+          <ac:spMkLst>
+            <pc:docMk/>
+            <pc:sldMk cId="933063407" sldId="262"/>
+            <ac:spMk id="4" creationId="{FB59B7D3-688A-49A8-A39D-4A0945A4CE35}"/>
+          </ac:spMkLst>
+        </pc:spChg>
+      </pc:sldChg>
+    </pc:docChg>
+  </pc:docChgLst>
 </pc:chgInfo>
+</file>
+
+<file path=ppt/notesMasters/notesMaster1.xml><?xml version="1.0" encoding="utf-8"?>
+<p:notesMaster xmlns:a="http://schemas.openxmlformats.org/drawingml/2006/main" xmlns:r="http://schemas.openxmlformats.org/officeDocument/2006/relationships" xmlns:p="http://schemas.openxmlformats.org/presentationml/2006/main">
+  <p:cSld>
+    <p:bg>
+      <p:bgRef idx="1001">
+        <a:schemeClr val="bg1"/>
+      </p:bgRef>
+    </p:bg>
+    <p:spTree>
+      <p:nvGrpSpPr>
+        <p:cNvPr id="1" name=""/>
+        <p:cNvGrpSpPr/>
+        <p:nvPr/>
+      </p:nvGrpSpPr>
+      <p:grpSpPr>
+        <a:xfrm>
+          <a:off x="0" y="0"/>
+          <a:ext cx="0" cy="0"/>
+          <a:chOff x="0" y="0"/>
+          <a:chExt cx="0" cy="0"/>
+        </a:xfrm>
+      </p:grpSpPr>
+      <p:sp>
+        <p:nvSpPr>
+          <p:cNvPr id="2" name="Header Placeholder 1"/>
+          <p:cNvSpPr>
+            <a:spLocks noGrp="1"/>
+          </p:cNvSpPr>
+          <p:nvPr>
+            <p:ph type="hdr" sz="quarter"/>
+          </p:nvPr>
+        </p:nvSpPr>
+        <p:spPr>
+          <a:xfrm>
+            <a:off x="0" y="0"/>
+            <a:ext cx="2971800" cy="458788"/>
+          </a:xfrm>
+          <a:prstGeom prst="rect">
+            <a:avLst/>
+          </a:prstGeom>
+        </p:spPr>
+        <p:txBody>
+          <a:bodyPr vert="horz" lIns="91440" tIns="45720" rIns="91440" bIns="45720" rtlCol="0"/>
+          <a:lstStyle>
+            <a:lvl1pPr algn="l">
+              <a:defRPr sz="1200"/>
+            </a:lvl1pPr>
+          </a:lstStyle>
+          <a:p>
+            <a:endParaRPr lang="en-US"/>
+          </a:p>
+        </p:txBody>
+      </p:sp>
+      <p:sp>
+        <p:nvSpPr>
+          <p:cNvPr id="3" name="Date Placeholder 2"/>
+          <p:cNvSpPr>
+            <a:spLocks noGrp="1"/>
+          </p:cNvSpPr>
+          <p:nvPr>
+            <p:ph type="dt" idx="1"/>
+          </p:nvPr>
+        </p:nvSpPr>
+        <p:spPr>
+          <a:xfrm>
+            <a:off x="3884613" y="0"/>
+            <a:ext cx="2971800" cy="458788"/>
+          </a:xfrm>
+          <a:prstGeom prst="rect">
+            <a:avLst/>
+          </a:prstGeom>
+        </p:spPr>
+        <p:txBody>
+          <a:bodyPr vert="horz" lIns="91440" tIns="45720" rIns="91440" bIns="45720" rtlCol="0"/>
+          <a:lstStyle>
+            <a:lvl1pPr algn="r">
+              <a:defRPr sz="1200"/>
+            </a:lvl1pPr>
+          </a:lstStyle>
+          <a:p>
+            <a:fld id="{9AAE3A36-8263-4F3B-B567-8EB7E590700E}" type="datetimeFigureOut">
+              <a:rPr lang="en-US" smtClean="0"/>
+              <a:t>9/25/2020</a:t>
+            </a:fld>
+            <a:endParaRPr lang="en-US"/>
+          </a:p>
+        </p:txBody>
+      </p:sp>
+      <p:sp>
+        <p:nvSpPr>
+          <p:cNvPr id="4" name="Slide Image Placeholder 3"/>
+          <p:cNvSpPr>
+            <a:spLocks noGrp="1" noRot="1" noChangeAspect="1"/>
+          </p:cNvSpPr>
+          <p:nvPr>
+            <p:ph type="sldImg" idx="2"/>
+          </p:nvPr>
+        </p:nvSpPr>
+        <p:spPr>
+          <a:xfrm>
+            <a:off x="685800" y="1143000"/>
+            <a:ext cx="5486400" cy="3086100"/>
+          </a:xfrm>
+          <a:prstGeom prst="rect">
+            <a:avLst/>
+          </a:prstGeom>
+          <a:noFill/>
+          <a:ln w="12700">
+            <a:solidFill>
+              <a:prstClr val="black"/>
+            </a:solidFill>
+          </a:ln>
+        </p:spPr>
+        <p:txBody>
+          <a:bodyPr vert="horz" lIns="91440" tIns="45720" rIns="91440" bIns="45720" rtlCol="0" anchor="ctr"/>
+          <a:lstStyle/>
+          <a:p>
+            <a:endParaRPr lang="en-US"/>
+          </a:p>
+        </p:txBody>
+      </p:sp>
+      <p:sp>
+        <p:nvSpPr>
+          <p:cNvPr id="5" name="Notes Placeholder 4"/>
+          <p:cNvSpPr>
+            <a:spLocks noGrp="1"/>
+          </p:cNvSpPr>
+          <p:nvPr>
+            <p:ph type="body" sz="quarter" idx="3"/>
+          </p:nvPr>
+        </p:nvSpPr>
+        <p:spPr>
+          <a:xfrm>
+            <a:off x="685800" y="4400550"/>
+            <a:ext cx="5486400" cy="3600450"/>
+          </a:xfrm>
+          <a:prstGeom prst="rect">
+            <a:avLst/>
+          </a:prstGeom>
+        </p:spPr>
+        <p:txBody>
+          <a:bodyPr vert="horz" lIns="91440" tIns="45720" rIns="91440" bIns="45720" rtlCol="0"/>
+          <a:lstStyle/>
+          <a:p>
+            <a:pPr lvl="0"/>
+            <a:r>
+              <a:rPr lang="en-US"/>
+              <a:t>Click to edit Master text styles</a:t>
+            </a:r>
+          </a:p>
+          <a:p>
+            <a:pPr lvl="1"/>
+            <a:r>
+              <a:rPr lang="en-US"/>
+              <a:t>Second level</a:t>
+            </a:r>
+          </a:p>
+          <a:p>
+            <a:pPr lvl="2"/>
+            <a:r>
+              <a:rPr lang="en-US"/>
+              <a:t>Third level</a:t>
+            </a:r>
+          </a:p>
+          <a:p>
+            <a:pPr lvl="3"/>
+            <a:r>
+              <a:rPr lang="en-US"/>
+              <a:t>Fourth level</a:t>
+            </a:r>
+          </a:p>
+          <a:p>
+            <a:pPr lvl="4"/>
+            <a:r>
+              <a:rPr lang="en-US"/>
+              <a:t>Fifth level</a:t>
+            </a:r>
+          </a:p>
+        </p:txBody>
+      </p:sp>
+      <p:sp>
+        <p:nvSpPr>
+          <p:cNvPr id="6" name="Footer Placeholder 5"/>
+          <p:cNvSpPr>
+            <a:spLocks noGrp="1"/>
+          </p:cNvSpPr>
+          <p:nvPr>
+            <p:ph type="ftr" sz="quarter" idx="4"/>
+          </p:nvPr>
+        </p:nvSpPr>
+        <p:spPr>
+          <a:xfrm>
+            <a:off x="0" y="8685213"/>
+            <a:ext cx="2971800" cy="458787"/>
+          </a:xfrm>
+          <a:prstGeom prst="rect">
+            <a:avLst/>
+          </a:prstGeom>
+        </p:spPr>
+        <p:txBody>
+          <a:bodyPr vert="horz" lIns="91440" tIns="45720" rIns="91440" bIns="45720" rtlCol="0" anchor="b"/>
+          <a:lstStyle>
+            <a:lvl1pPr algn="l">
+              <a:defRPr sz="1200"/>
+            </a:lvl1pPr>
+          </a:lstStyle>
+          <a:p>
+            <a:endParaRPr lang="en-US"/>
+          </a:p>
+        </p:txBody>
+      </p:sp>
+      <p:sp>
+        <p:nvSpPr>
+          <p:cNvPr id="7" name="Slide Number Placeholder 6"/>
+          <p:cNvSpPr>
+            <a:spLocks noGrp="1"/>
+          </p:cNvSpPr>
+          <p:nvPr>
+            <p:ph type="sldNum" sz="quarter" idx="5"/>
+          </p:nvPr>
+        </p:nvSpPr>
+        <p:spPr>
+          <a:xfrm>
+            <a:off x="3884613" y="8685213"/>
+            <a:ext cx="2971800" cy="458787"/>
+          </a:xfrm>
+          <a:prstGeom prst="rect">
+            <a:avLst/>
+          </a:prstGeom>
+        </p:spPr>
+        <p:txBody>
+          <a:bodyPr vert="horz" lIns="91440" tIns="45720" rIns="91440" bIns="45720" rtlCol="0" anchor="b"/>
+          <a:lstStyle>
+            <a:lvl1pPr algn="r">
+              <a:defRPr sz="1200"/>
+            </a:lvl1pPr>
+          </a:lstStyle>
+          <a:p>
+            <a:fld id="{89FA40B3-7CF3-4D70-A940-F33BEE8F7977}" type="slidenum">
+              <a:rPr lang="en-US" smtClean="0"/>
+              <a:t>‹#›</a:t>
+            </a:fld>
+            <a:endParaRPr lang="en-US"/>
+          </a:p>
+        </p:txBody>
+      </p:sp>
+    </p:spTree>
+    <p:extLst>
+      <p:ext uri="{BB962C8B-B14F-4D97-AF65-F5344CB8AC3E}">
+        <p14:creationId xmlns:p14="http://schemas.microsoft.com/office/powerpoint/2010/main" val="3136530300"/>
+      </p:ext>
+    </p:extLst>
+  </p:cSld>
+  <p:clrMap bg1="lt1" tx1="dk1" bg2="lt2" tx2="dk2" accent1="accent1" accent2="accent2" accent3="accent3" accent4="accent4" accent5="accent5" accent6="accent6" hlink="hlink" folHlink="folHlink"/>
+  <p:notesStyle>
+    <a:lvl1pPr marL="0" algn="l" defTabSz="914400" rtl="0" eaLnBrk="1" latinLnBrk="0" hangingPunct="1">
+      <a:defRPr sz="1200" kern="1200">
+        <a:solidFill>
+          <a:schemeClr val="tx1"/>
+        </a:solidFill>
+        <a:latin typeface="+mn-lt"/>
+        <a:ea typeface="+mn-ea"/>
+        <a:cs typeface="+mn-cs"/>
+      </a:defRPr>
+    </a:lvl1pPr>
+    <a:lvl2pPr marL="457200" algn="l" defTabSz="914400" rtl="0" eaLnBrk="1" latinLnBrk="0" hangingPunct="1">
+      <a:defRPr sz="1200" kern="1200">
+        <a:solidFill>
+          <a:schemeClr val="tx1"/>
+        </a:solidFill>
+        <a:latin typeface="+mn-lt"/>
+        <a:ea typeface="+mn-ea"/>
+        <a:cs typeface="+mn-cs"/>
+      </a:defRPr>
+    </a:lvl2pPr>
+    <a:lvl3pPr marL="914400" algn="l" defTabSz="914400" rtl="0" eaLnBrk="1" latinLnBrk="0" hangingPunct="1">
+      <a:defRPr sz="1200" kern="1200">
+        <a:solidFill>
+          <a:schemeClr val="tx1"/>
+        </a:solidFill>
+        <a:latin typeface="+mn-lt"/>
+        <a:ea typeface="+mn-ea"/>
+        <a:cs typeface="+mn-cs"/>
+      </a:defRPr>
+    </a:lvl3pPr>
+    <a:lvl4pPr marL="1371600" algn="l" defTabSz="914400" rtl="0" eaLnBrk="1" latinLnBrk="0" hangingPunct="1">
+      <a:defRPr sz="1200" kern="1200">
+        <a:solidFill>
+          <a:schemeClr val="tx1"/>
+        </a:solidFill>
+        <a:latin typeface="+mn-lt"/>
+        <a:ea typeface="+mn-ea"/>
+        <a:cs typeface="+mn-cs"/>
+      </a:defRPr>
+    </a:lvl4pPr>
+    <a:lvl5pPr marL="1828800" algn="l" defTabSz="914400" rtl="0" eaLnBrk="1" latinLnBrk="0" hangingPunct="1">
+      <a:defRPr sz="1200" kern="1200">
+        <a:solidFill>
+          <a:schemeClr val="tx1"/>
+        </a:solidFill>
+        <a:latin typeface="+mn-lt"/>
+        <a:ea typeface="+mn-ea"/>
+        <a:cs typeface="+mn-cs"/>
+      </a:defRPr>
+    </a:lvl5pPr>
+    <a:lvl6pPr marL="2286000" algn="l" defTabSz="914400" rtl="0" eaLnBrk="1" latinLnBrk="0" hangingPunct="1">
+      <a:defRPr sz="1200" kern="1200">
+        <a:solidFill>
+          <a:schemeClr val="tx1"/>
+        </a:solidFill>
+        <a:latin typeface="+mn-lt"/>
+        <a:ea typeface="+mn-ea"/>
+        <a:cs typeface="+mn-cs"/>
+      </a:defRPr>
+    </a:lvl6pPr>
+    <a:lvl7pPr marL="2743200" algn="l" defTabSz="914400" rtl="0" eaLnBrk="1" latinLnBrk="0" hangingPunct="1">
+      <a:defRPr sz="1200" kern="1200">
+        <a:solidFill>
+          <a:schemeClr val="tx1"/>
+        </a:solidFill>
+        <a:latin typeface="+mn-lt"/>
+        <a:ea typeface="+mn-ea"/>
+        <a:cs typeface="+mn-cs"/>
+      </a:defRPr>
+    </a:lvl7pPr>
+    <a:lvl8pPr marL="3200400" algn="l" defTabSz="914400" rtl="0" eaLnBrk="1" latinLnBrk="0" hangingPunct="1">
+      <a:defRPr sz="1200" kern="1200">
+        <a:solidFill>
+          <a:schemeClr val="tx1"/>
+        </a:solidFill>
+        <a:latin typeface="+mn-lt"/>
+        <a:ea typeface="+mn-ea"/>
+        <a:cs typeface="+mn-cs"/>
+      </a:defRPr>
+    </a:lvl8pPr>
+    <a:lvl9pPr marL="3657600" algn="l" defTabSz="914400" rtl="0" eaLnBrk="1" latinLnBrk="0" hangingPunct="1">
+      <a:defRPr sz="1200" kern="1200">
+        <a:solidFill>
+          <a:schemeClr val="tx1"/>
+        </a:solidFill>
+        <a:latin typeface="+mn-lt"/>
+        <a:ea typeface="+mn-ea"/>
+        <a:cs typeface="+mn-cs"/>
+      </a:defRPr>
+    </a:lvl9pPr>
+  </p:notesStyle>
+</p:notesMaster>
+</file>
+
+<file path=ppt/notesSlides/notesSlide1.xml><?xml version="1.0" encoding="utf-8"?>
+<p:notes xmlns:a="http://schemas.openxmlformats.org/drawingml/2006/main" xmlns:r="http://schemas.openxmlformats.org/officeDocument/2006/relationships" xmlns:p="http://schemas.openxmlformats.org/presentationml/2006/main">
+  <p:cSld>
+    <p:spTree>
+      <p:nvGrpSpPr>
+        <p:cNvPr id="1" name=""/>
+        <p:cNvGrpSpPr/>
+        <p:nvPr/>
+      </p:nvGrpSpPr>
+      <p:grpSpPr>
+        <a:xfrm>
+          <a:off x="0" y="0"/>
+          <a:ext cx="0" cy="0"/>
+          <a:chOff x="0" y="0"/>
+          <a:chExt cx="0" cy="0"/>
+        </a:xfrm>
+      </p:grpSpPr>
+      <p:sp>
+        <p:nvSpPr>
+          <p:cNvPr id="2" name="Slide Image Placeholder 1"/>
+          <p:cNvSpPr>
+            <a:spLocks noGrp="1" noRot="1" noChangeAspect="1"/>
+          </p:cNvSpPr>
+          <p:nvPr>
+            <p:ph type="sldImg"/>
+          </p:nvPr>
+        </p:nvSpPr>
+        <p:spPr/>
+      </p:sp>
+      <p:sp>
+        <p:nvSpPr>
+          <p:cNvPr id="3" name="Notes Placeholder 2"/>
+          <p:cNvSpPr>
+            <a:spLocks noGrp="1"/>
+          </p:cNvSpPr>
+          <p:nvPr>
+            <p:ph type="body" idx="1"/>
+          </p:nvPr>
+        </p:nvSpPr>
+        <p:spPr/>
+        <p:txBody>
+          <a:bodyPr/>
+          <a:lstStyle/>
+          <a:p>
+            <a:pPr marL="0" marR="0" lvl="0" indent="0" algn="l" defTabSz="914400" rtl="0" eaLnBrk="1" fontAlgn="auto" latinLnBrk="0" hangingPunct="1">
+              <a:lnSpc>
+                <a:spcPct val="100000"/>
+              </a:lnSpc>
+              <a:spcBef>
+                <a:spcPts val="0"/>
+              </a:spcBef>
+              <a:spcAft>
+                <a:spcPts val="0"/>
+              </a:spcAft>
+              <a:buClrTx/>
+              <a:buSzTx/>
+              <a:buFontTx/>
+              <a:buNone/>
+              <a:tabLst/>
+              <a:defRPr/>
+            </a:pPr>
+            <a:r>
+              <a:rPr lang="en-US" dirty="0"/>
+              <a:t>The global pandemic has affected us all. Feelings of isolation, depression and anxiety are on the rise. The spread of COVID-19 has caused a global economic recession. In response, c</a:t>
+            </a:r>
+            <a:r>
+              <a:rPr lang="en-US" dirty="0">
+                <a:effectLst/>
+              </a:rPr>
+              <a:t>ustomers expect businesses to find new, compassionate ways to connect with them online.</a:t>
+            </a:r>
+          </a:p>
+          <a:p>
+            <a:endParaRPr lang="en-US" dirty="0"/>
+          </a:p>
+        </p:txBody>
+      </p:sp>
+      <p:sp>
+        <p:nvSpPr>
+          <p:cNvPr id="4" name="Slide Number Placeholder 3"/>
+          <p:cNvSpPr>
+            <a:spLocks noGrp="1"/>
+          </p:cNvSpPr>
+          <p:nvPr>
+            <p:ph type="sldNum" sz="quarter" idx="5"/>
+          </p:nvPr>
+        </p:nvSpPr>
+        <p:spPr/>
+        <p:txBody>
+          <a:bodyPr/>
+          <a:lstStyle/>
+          <a:p>
+            <a:fld id="{89FA40B3-7CF3-4D70-A940-F33BEE8F7977}" type="slidenum">
+              <a:rPr lang="en-US" smtClean="0"/>
+              <a:t>1</a:t>
+            </a:fld>
+            <a:endParaRPr lang="en-US"/>
+          </a:p>
+        </p:txBody>
+      </p:sp>
+    </p:spTree>
+    <p:extLst>
+      <p:ext uri="{BB962C8B-B14F-4D97-AF65-F5344CB8AC3E}">
+        <p14:creationId xmlns:p14="http://schemas.microsoft.com/office/powerpoint/2010/main" val="2850194989"/>
+      </p:ext>
+    </p:extLst>
+  </p:cSld>
+  <p:clrMapOvr>
+    <a:masterClrMapping/>
+  </p:clrMapOvr>
+</p:notes>
+</file>
+
+<file path=ppt/notesSlides/notesSlide2.xml><?xml version="1.0" encoding="utf-8"?>
+<p:notes xmlns:a="http://schemas.openxmlformats.org/drawingml/2006/main" xmlns:r="http://schemas.openxmlformats.org/officeDocument/2006/relationships" xmlns:p="http://schemas.openxmlformats.org/presentationml/2006/main">
+  <p:cSld>
+    <p:spTree>
+      <p:nvGrpSpPr>
+        <p:cNvPr id="1" name=""/>
+        <p:cNvGrpSpPr/>
+        <p:nvPr/>
+      </p:nvGrpSpPr>
+      <p:grpSpPr>
+        <a:xfrm>
+          <a:off x="0" y="0"/>
+          <a:ext cx="0" cy="0"/>
+          <a:chOff x="0" y="0"/>
+          <a:chExt cx="0" cy="0"/>
+        </a:xfrm>
+      </p:grpSpPr>
+      <p:sp>
+        <p:nvSpPr>
+          <p:cNvPr id="2" name="Slide Image Placeholder 1"/>
+          <p:cNvSpPr>
+            <a:spLocks noGrp="1" noRot="1" noChangeAspect="1"/>
+          </p:cNvSpPr>
+          <p:nvPr>
+            <p:ph type="sldImg"/>
+          </p:nvPr>
+        </p:nvSpPr>
+        <p:spPr/>
+      </p:sp>
+      <p:sp>
+        <p:nvSpPr>
+          <p:cNvPr id="3" name="Notes Placeholder 2"/>
+          <p:cNvSpPr>
+            <a:spLocks noGrp="1"/>
+          </p:cNvSpPr>
+          <p:nvPr>
+            <p:ph type="body" idx="1"/>
+          </p:nvPr>
+        </p:nvSpPr>
+        <p:spPr/>
+        <p:txBody>
+          <a:bodyPr/>
+          <a:lstStyle/>
+          <a:p>
+            <a:r>
+              <a:rPr lang="en-US" dirty="0"/>
+              <a:t>Our solution is to build an artificial intelligence that listens and makes helpful suggestions. The interactive AI is trained on techniques that have been demonstrated effective at lowering stress and anxiety. The AI establishes a connection and gets permission from customers to make personalized suggestions. We use a linear optimizer to find creative suggestions for reaching personal goals with minimum hardship. Customers can improve the intelligence by connecting to their transaction history and to special-purpose knowledge bases.</a:t>
+            </a:r>
+          </a:p>
+        </p:txBody>
+      </p:sp>
+      <p:sp>
+        <p:nvSpPr>
+          <p:cNvPr id="4" name="Slide Number Placeholder 3"/>
+          <p:cNvSpPr>
+            <a:spLocks noGrp="1"/>
+          </p:cNvSpPr>
+          <p:nvPr>
+            <p:ph type="sldNum" sz="quarter" idx="5"/>
+          </p:nvPr>
+        </p:nvSpPr>
+        <p:spPr/>
+        <p:txBody>
+          <a:bodyPr/>
+          <a:lstStyle/>
+          <a:p>
+            <a:fld id="{89FA40B3-7CF3-4D70-A940-F33BEE8F7977}" type="slidenum">
+              <a:rPr lang="en-US" smtClean="0"/>
+              <a:t>2</a:t>
+            </a:fld>
+            <a:endParaRPr lang="en-US"/>
+          </a:p>
+        </p:txBody>
+      </p:sp>
+    </p:spTree>
+    <p:extLst>
+      <p:ext uri="{BB962C8B-B14F-4D97-AF65-F5344CB8AC3E}">
+        <p14:creationId xmlns:p14="http://schemas.microsoft.com/office/powerpoint/2010/main" val="2141150538"/>
+      </p:ext>
+    </p:extLst>
+  </p:cSld>
+  <p:clrMapOvr>
+    <a:masterClrMapping/>
+  </p:clrMapOvr>
+</p:notes>
+</file>
+
+<file path=ppt/notesSlides/notesSlide3.xml><?xml version="1.0" encoding="utf-8"?>
+<p:notes xmlns:a="http://schemas.openxmlformats.org/drawingml/2006/main" xmlns:r="http://schemas.openxmlformats.org/officeDocument/2006/relationships" xmlns:p="http://schemas.openxmlformats.org/presentationml/2006/main">
+  <p:cSld>
+    <p:spTree>
+      <p:nvGrpSpPr>
+        <p:cNvPr id="1" name=""/>
+        <p:cNvGrpSpPr/>
+        <p:nvPr/>
+      </p:nvGrpSpPr>
+      <p:grpSpPr>
+        <a:xfrm>
+          <a:off x="0" y="0"/>
+          <a:ext cx="0" cy="0"/>
+          <a:chOff x="0" y="0"/>
+          <a:chExt cx="0" cy="0"/>
+        </a:xfrm>
+      </p:grpSpPr>
+      <p:sp>
+        <p:nvSpPr>
+          <p:cNvPr id="2" name="Slide Image Placeholder 1"/>
+          <p:cNvSpPr>
+            <a:spLocks noGrp="1" noRot="1" noChangeAspect="1"/>
+          </p:cNvSpPr>
+          <p:nvPr>
+            <p:ph type="sldImg"/>
+          </p:nvPr>
+        </p:nvSpPr>
+        <p:spPr/>
+      </p:sp>
+      <p:sp>
+        <p:nvSpPr>
+          <p:cNvPr id="3" name="Notes Placeholder 2"/>
+          <p:cNvSpPr>
+            <a:spLocks noGrp="1"/>
+          </p:cNvSpPr>
+          <p:nvPr>
+            <p:ph type="body" idx="1"/>
+          </p:nvPr>
+        </p:nvSpPr>
+        <p:spPr/>
+        <p:txBody>
+          <a:bodyPr/>
+          <a:lstStyle/>
+          <a:p>
+            <a:r>
+              <a:rPr lang="en-US" dirty="0"/>
+              <a:t>We’ve designed the software as custom extensions to an open core. The core of the software is a Python/Flask application connected to a </a:t>
+            </a:r>
+            <a:r>
+              <a:rPr lang="en-US" dirty="0" err="1"/>
+              <a:t>DialogFlow</a:t>
+            </a:r>
+            <a:r>
+              <a:rPr lang="en-US" dirty="0"/>
+              <a:t> chatbot. This is all opensource and it can be used to engage both current and prospective customers. </a:t>
+            </a:r>
+          </a:p>
+          <a:p>
+            <a:endParaRPr lang="en-US" dirty="0"/>
+          </a:p>
+          <a:p>
+            <a:r>
+              <a:rPr lang="en-US" dirty="0"/>
+              <a:t>Custom extensions are built from the bank APIs. This idea is based on the work we’ve done in the Applied AI Studio under the guidance of Naresh Vyas. Historical transaction data, and custom knowledgebase data are used to make the AI even more personal and useful. This is a powerful incentive for attracting new customers and retaining existing ones.</a:t>
+            </a:r>
+          </a:p>
+        </p:txBody>
+      </p:sp>
+      <p:sp>
+        <p:nvSpPr>
+          <p:cNvPr id="4" name="Slide Number Placeholder 3"/>
+          <p:cNvSpPr>
+            <a:spLocks noGrp="1"/>
+          </p:cNvSpPr>
+          <p:nvPr>
+            <p:ph type="sldNum" sz="quarter" idx="5"/>
+          </p:nvPr>
+        </p:nvSpPr>
+        <p:spPr/>
+        <p:txBody>
+          <a:bodyPr/>
+          <a:lstStyle/>
+          <a:p>
+            <a:fld id="{89FA40B3-7CF3-4D70-A940-F33BEE8F7977}" type="slidenum">
+              <a:rPr lang="en-US" smtClean="0"/>
+              <a:t>3</a:t>
+            </a:fld>
+            <a:endParaRPr lang="en-US"/>
+          </a:p>
+        </p:txBody>
+      </p:sp>
+    </p:spTree>
+    <p:extLst>
+      <p:ext uri="{BB962C8B-B14F-4D97-AF65-F5344CB8AC3E}">
+        <p14:creationId xmlns:p14="http://schemas.microsoft.com/office/powerpoint/2010/main" val="3995730506"/>
+      </p:ext>
+    </p:extLst>
+  </p:cSld>
+  <p:clrMapOvr>
+    <a:masterClrMapping/>
+  </p:clrMapOvr>
+</p:notes>
+</file>
+
+<file path=ppt/notesSlides/notesSlide4.xml><?xml version="1.0" encoding="utf-8"?>
+<p:notes xmlns:a="http://schemas.openxmlformats.org/drawingml/2006/main" xmlns:r="http://schemas.openxmlformats.org/officeDocument/2006/relationships" xmlns:p="http://schemas.openxmlformats.org/presentationml/2006/main">
+  <p:cSld>
+    <p:spTree>
+      <p:nvGrpSpPr>
+        <p:cNvPr id="1" name=""/>
+        <p:cNvGrpSpPr/>
+        <p:nvPr/>
+      </p:nvGrpSpPr>
+      <p:grpSpPr>
+        <a:xfrm>
+          <a:off x="0" y="0"/>
+          <a:ext cx="0" cy="0"/>
+          <a:chOff x="0" y="0"/>
+          <a:chExt cx="0" cy="0"/>
+        </a:xfrm>
+      </p:grpSpPr>
+      <p:sp>
+        <p:nvSpPr>
+          <p:cNvPr id="2" name="Slide Image Placeholder 1"/>
+          <p:cNvSpPr>
+            <a:spLocks noGrp="1" noRot="1" noChangeAspect="1"/>
+          </p:cNvSpPr>
+          <p:nvPr>
+            <p:ph type="sldImg"/>
+          </p:nvPr>
+        </p:nvSpPr>
+        <p:spPr/>
+      </p:sp>
+      <p:sp>
+        <p:nvSpPr>
+          <p:cNvPr id="3" name="Notes Placeholder 2"/>
+          <p:cNvSpPr>
+            <a:spLocks noGrp="1"/>
+          </p:cNvSpPr>
+          <p:nvPr>
+            <p:ph type="body" idx="1"/>
+          </p:nvPr>
+        </p:nvSpPr>
+        <p:spPr/>
+        <p:txBody>
+          <a:bodyPr/>
+          <a:lstStyle/>
+          <a:p>
+            <a:r>
+              <a:rPr lang="en-US" dirty="0"/>
+              <a:t>This solution is one of the best ways to use the digital channel to show customers care and concern without marketing to them. It provides a unique balance of open access and personal relevance.</a:t>
+            </a:r>
+          </a:p>
+        </p:txBody>
+      </p:sp>
+      <p:sp>
+        <p:nvSpPr>
+          <p:cNvPr id="4" name="Slide Number Placeholder 3"/>
+          <p:cNvSpPr>
+            <a:spLocks noGrp="1"/>
+          </p:cNvSpPr>
+          <p:nvPr>
+            <p:ph type="sldNum" sz="quarter" idx="5"/>
+          </p:nvPr>
+        </p:nvSpPr>
+        <p:spPr/>
+        <p:txBody>
+          <a:bodyPr/>
+          <a:lstStyle/>
+          <a:p>
+            <a:fld id="{89FA40B3-7CF3-4D70-A940-F33BEE8F7977}" type="slidenum">
+              <a:rPr lang="en-US" smtClean="0"/>
+              <a:t>4</a:t>
+            </a:fld>
+            <a:endParaRPr lang="en-US"/>
+          </a:p>
+        </p:txBody>
+      </p:sp>
+    </p:spTree>
+    <p:extLst>
+      <p:ext uri="{BB962C8B-B14F-4D97-AF65-F5344CB8AC3E}">
+        <p14:creationId xmlns:p14="http://schemas.microsoft.com/office/powerpoint/2010/main" val="3516152381"/>
+      </p:ext>
+    </p:extLst>
+  </p:cSld>
+  <p:clrMapOvr>
+    <a:masterClrMapping/>
+  </p:clrMapOvr>
+</p:notes>
+</file>
+
+<file path=ppt/notesSlides/notesSlide5.xml><?xml version="1.0" encoding="utf-8"?>
+<p:notes xmlns:a="http://schemas.openxmlformats.org/drawingml/2006/main" xmlns:r="http://schemas.openxmlformats.org/officeDocument/2006/relationships" xmlns:p="http://schemas.openxmlformats.org/presentationml/2006/main">
+  <p:cSld>
+    <p:spTree>
+      <p:nvGrpSpPr>
+        <p:cNvPr id="1" name=""/>
+        <p:cNvGrpSpPr/>
+        <p:nvPr/>
+      </p:nvGrpSpPr>
+      <p:grpSpPr>
+        <a:xfrm>
+          <a:off x="0" y="0"/>
+          <a:ext cx="0" cy="0"/>
+          <a:chOff x="0" y="0"/>
+          <a:chExt cx="0" cy="0"/>
+        </a:xfrm>
+      </p:grpSpPr>
+      <p:sp>
+        <p:nvSpPr>
+          <p:cNvPr id="2" name="Slide Image Placeholder 1"/>
+          <p:cNvSpPr>
+            <a:spLocks noGrp="1" noRot="1" noChangeAspect="1"/>
+          </p:cNvSpPr>
+          <p:nvPr>
+            <p:ph type="sldImg"/>
+          </p:nvPr>
+        </p:nvSpPr>
+        <p:spPr/>
+      </p:sp>
+      <p:sp>
+        <p:nvSpPr>
+          <p:cNvPr id="3" name="Notes Placeholder 2"/>
+          <p:cNvSpPr>
+            <a:spLocks noGrp="1"/>
+          </p:cNvSpPr>
+          <p:nvPr>
+            <p:ph type="body" idx="1"/>
+          </p:nvPr>
+        </p:nvSpPr>
+        <p:spPr/>
+        <p:txBody>
+          <a:bodyPr/>
+          <a:lstStyle/>
+          <a:p>
+            <a:r>
+              <a:rPr lang="en-US" dirty="0"/>
+              <a:t>This solution increases your company’s net promoter score (NPS). Before the event, we beta-tested this technique and the result was an 80 NPS. For financial services companies, the lifetime value of a promoter is more than twice that of a detractor.</a:t>
+            </a:r>
+          </a:p>
+        </p:txBody>
+      </p:sp>
+      <p:sp>
+        <p:nvSpPr>
+          <p:cNvPr id="4" name="Slide Number Placeholder 3"/>
+          <p:cNvSpPr>
+            <a:spLocks noGrp="1"/>
+          </p:cNvSpPr>
+          <p:nvPr>
+            <p:ph type="sldNum" sz="quarter" idx="5"/>
+          </p:nvPr>
+        </p:nvSpPr>
+        <p:spPr/>
+        <p:txBody>
+          <a:bodyPr/>
+          <a:lstStyle/>
+          <a:p>
+            <a:fld id="{89FA40B3-7CF3-4D70-A940-F33BEE8F7977}" type="slidenum">
+              <a:rPr lang="en-US" smtClean="0"/>
+              <a:t>5</a:t>
+            </a:fld>
+            <a:endParaRPr lang="en-US"/>
+          </a:p>
+        </p:txBody>
+      </p:sp>
+    </p:spTree>
+    <p:extLst>
+      <p:ext uri="{BB962C8B-B14F-4D97-AF65-F5344CB8AC3E}">
+        <p14:creationId xmlns:p14="http://schemas.microsoft.com/office/powerpoint/2010/main" val="1167278582"/>
+      </p:ext>
+    </p:extLst>
+  </p:cSld>
+  <p:clrMapOvr>
+    <a:masterClrMapping/>
+  </p:clrMapOvr>
+</p:notes>
+</file>
+
+<file path=ppt/notesSlides/notesSlide6.xml><?xml version="1.0" encoding="utf-8"?>
+<p:notes xmlns:a="http://schemas.openxmlformats.org/drawingml/2006/main" xmlns:r="http://schemas.openxmlformats.org/officeDocument/2006/relationships" xmlns:p="http://schemas.openxmlformats.org/presentationml/2006/main">
+  <p:cSld>
+    <p:spTree>
+      <p:nvGrpSpPr>
+        <p:cNvPr id="1" name=""/>
+        <p:cNvGrpSpPr/>
+        <p:nvPr/>
+      </p:nvGrpSpPr>
+      <p:grpSpPr>
+        <a:xfrm>
+          <a:off x="0" y="0"/>
+          <a:ext cx="0" cy="0"/>
+          <a:chOff x="0" y="0"/>
+          <a:chExt cx="0" cy="0"/>
+        </a:xfrm>
+      </p:grpSpPr>
+      <p:sp>
+        <p:nvSpPr>
+          <p:cNvPr id="2" name="Slide Image Placeholder 1"/>
+          <p:cNvSpPr>
+            <a:spLocks noGrp="1" noRot="1" noChangeAspect="1"/>
+          </p:cNvSpPr>
+          <p:nvPr>
+            <p:ph type="sldImg"/>
+          </p:nvPr>
+        </p:nvSpPr>
+        <p:spPr/>
+      </p:sp>
+      <p:sp>
+        <p:nvSpPr>
+          <p:cNvPr id="3" name="Notes Placeholder 2"/>
+          <p:cNvSpPr>
+            <a:spLocks noGrp="1"/>
+          </p:cNvSpPr>
+          <p:nvPr>
+            <p:ph type="body" idx="1"/>
+          </p:nvPr>
+        </p:nvSpPr>
+        <p:spPr/>
+        <p:txBody>
+          <a:bodyPr/>
+          <a:lstStyle/>
+          <a:p>
+            <a:r>
+              <a:rPr lang="en-US" dirty="0"/>
+              <a:t>Our team comes from DXC’s Applied AI Studio:</a:t>
+            </a:r>
+          </a:p>
+          <a:p>
+            <a:pPr marL="171450" indent="-171450">
+              <a:buFontTx/>
+              <a:buChar char="-"/>
+            </a:pPr>
+            <a:r>
+              <a:rPr lang="en-US" dirty="0"/>
+              <a:t>Om Singh</a:t>
+            </a:r>
+          </a:p>
+          <a:p>
+            <a:pPr marL="171450" indent="-171450">
+              <a:buFontTx/>
+              <a:buChar char="-"/>
+            </a:pPr>
+            <a:r>
+              <a:rPr lang="en-US" dirty="0"/>
+              <a:t>Hitesh Kumar</a:t>
+            </a:r>
+          </a:p>
+          <a:p>
+            <a:pPr marL="171450" indent="-171450">
+              <a:buFontTx/>
+              <a:buChar char="-"/>
+            </a:pPr>
+            <a:r>
+              <a:rPr lang="en-US" dirty="0"/>
+              <a:t>Angeli Trinidad</a:t>
+            </a:r>
+          </a:p>
+          <a:p>
+            <a:pPr marL="171450" indent="-171450">
+              <a:buFontTx/>
+              <a:buChar char="-"/>
+            </a:pPr>
+            <a:r>
+              <a:rPr lang="en-US" dirty="0"/>
+              <a:t>Hemanth Arikatla</a:t>
+            </a:r>
+          </a:p>
+          <a:p>
+            <a:pPr marL="171450" indent="-171450">
+              <a:buFontTx/>
+              <a:buChar char="-"/>
+            </a:pPr>
+            <a:r>
+              <a:rPr lang="en-US" dirty="0"/>
+              <a:t>And I’m Jerry Overton</a:t>
+            </a:r>
+          </a:p>
+          <a:p>
+            <a:pPr marL="171450" indent="-171450">
+              <a:buFontTx/>
+              <a:buChar char="-"/>
+            </a:pPr>
+            <a:endParaRPr lang="en-US" dirty="0"/>
+          </a:p>
+          <a:p>
+            <a:pPr marL="0" indent="0">
+              <a:buFontTx/>
+              <a:buNone/>
+            </a:pPr>
+            <a:r>
+              <a:rPr lang="en-US" dirty="0"/>
+              <a:t>We’ve published a demo so that you can try the solution yourself. We’ve open-sourced the project and so that we can build a community contributors.</a:t>
+            </a:r>
+          </a:p>
+        </p:txBody>
+      </p:sp>
+      <p:sp>
+        <p:nvSpPr>
+          <p:cNvPr id="4" name="Slide Number Placeholder 3"/>
+          <p:cNvSpPr>
+            <a:spLocks noGrp="1"/>
+          </p:cNvSpPr>
+          <p:nvPr>
+            <p:ph type="sldNum" sz="quarter" idx="5"/>
+          </p:nvPr>
+        </p:nvSpPr>
+        <p:spPr/>
+        <p:txBody>
+          <a:bodyPr/>
+          <a:lstStyle/>
+          <a:p>
+            <a:fld id="{89FA40B3-7CF3-4D70-A940-F33BEE8F7977}" type="slidenum">
+              <a:rPr lang="en-US" smtClean="0"/>
+              <a:t>6</a:t>
+            </a:fld>
+            <a:endParaRPr lang="en-US"/>
+          </a:p>
+        </p:txBody>
+      </p:sp>
+    </p:spTree>
+    <p:extLst>
+      <p:ext uri="{BB962C8B-B14F-4D97-AF65-F5344CB8AC3E}">
+        <p14:creationId xmlns:p14="http://schemas.microsoft.com/office/powerpoint/2010/main" val="689583130"/>
+      </p:ext>
+    </p:extLst>
+  </p:cSld>
+  <p:clrMapOvr>
+    <a:masterClrMapping/>
+  </p:clrMapOvr>
+</p:notes>
+</file>
+
+<file path=ppt/notesSlides/notesSlide7.xml><?xml version="1.0" encoding="utf-8"?>
+<p:notes xmlns:a="http://schemas.openxmlformats.org/drawingml/2006/main" xmlns:r="http://schemas.openxmlformats.org/officeDocument/2006/relationships" xmlns:p="http://schemas.openxmlformats.org/presentationml/2006/main">
+  <p:cSld>
+    <p:spTree>
+      <p:nvGrpSpPr>
+        <p:cNvPr id="1" name=""/>
+        <p:cNvGrpSpPr/>
+        <p:nvPr/>
+      </p:nvGrpSpPr>
+      <p:grpSpPr>
+        <a:xfrm>
+          <a:off x="0" y="0"/>
+          <a:ext cx="0" cy="0"/>
+          <a:chOff x="0" y="0"/>
+          <a:chExt cx="0" cy="0"/>
+        </a:xfrm>
+      </p:grpSpPr>
+      <p:sp>
+        <p:nvSpPr>
+          <p:cNvPr id="2" name="Slide Image Placeholder 1"/>
+          <p:cNvSpPr>
+            <a:spLocks noGrp="1" noRot="1" noChangeAspect="1"/>
+          </p:cNvSpPr>
+          <p:nvPr>
+            <p:ph type="sldImg"/>
+          </p:nvPr>
+        </p:nvSpPr>
+        <p:spPr/>
+      </p:sp>
+      <p:sp>
+        <p:nvSpPr>
+          <p:cNvPr id="3" name="Notes Placeholder 2"/>
+          <p:cNvSpPr>
+            <a:spLocks noGrp="1"/>
+          </p:cNvSpPr>
+          <p:nvPr>
+            <p:ph type="body" idx="1"/>
+          </p:nvPr>
+        </p:nvSpPr>
+        <p:spPr/>
+        <p:txBody>
+          <a:bodyPr/>
+          <a:lstStyle/>
+          <a:p>
+            <a:r>
+              <a:rPr lang="en-US" dirty="0"/>
+              <a:t>In the road ahead, we’ll build the code into a beta release. We’ll use what we learned from the beta to launch release 1. Release 2 will be the custom, proprietary extensions the open core of Release 1.</a:t>
+            </a:r>
+          </a:p>
+          <a:p>
+            <a:endParaRPr lang="en-US" dirty="0"/>
+          </a:p>
+          <a:p>
+            <a:r>
+              <a:rPr lang="en-US" dirty="0"/>
+              <a:t>Thanks so much to Ulster Bank, </a:t>
+            </a:r>
+            <a:r>
+              <a:rPr lang="en-US" dirty="0" err="1"/>
+              <a:t>DogPatch</a:t>
+            </a:r>
+            <a:r>
+              <a:rPr lang="en-US" dirty="0"/>
+              <a:t> Labs, and the NatWest Group for the Ulster Bank 2020 Hackathon.</a:t>
+            </a:r>
+          </a:p>
+        </p:txBody>
+      </p:sp>
+      <p:sp>
+        <p:nvSpPr>
+          <p:cNvPr id="4" name="Slide Number Placeholder 3"/>
+          <p:cNvSpPr>
+            <a:spLocks noGrp="1"/>
+          </p:cNvSpPr>
+          <p:nvPr>
+            <p:ph type="sldNum" sz="quarter" idx="5"/>
+          </p:nvPr>
+        </p:nvSpPr>
+        <p:spPr/>
+        <p:txBody>
+          <a:bodyPr/>
+          <a:lstStyle/>
+          <a:p>
+            <a:fld id="{89FA40B3-7CF3-4D70-A940-F33BEE8F7977}" type="slidenum">
+              <a:rPr lang="en-US" smtClean="0"/>
+              <a:t>7</a:t>
+            </a:fld>
+            <a:endParaRPr lang="en-US"/>
+          </a:p>
+        </p:txBody>
+      </p:sp>
+    </p:spTree>
+    <p:extLst>
+      <p:ext uri="{BB962C8B-B14F-4D97-AF65-F5344CB8AC3E}">
+        <p14:creationId xmlns:p14="http://schemas.microsoft.com/office/powerpoint/2010/main" val="4166774618"/>
+      </p:ext>
+    </p:extLst>
+  </p:cSld>
+  <p:clrMapOvr>
+    <a:masterClrMapping/>
+  </p:clrMapOvr>
+</p:notes>
 </file>
 
 <file path=ppt/slideLayouts/slideLayout1.xml><?xml version="1.0" encoding="utf-8"?>
@@ -4191,6 +5423,45 @@
           </a:p>
         </p:txBody>
       </p:sp>
+      <p:sp>
+        <p:nvSpPr>
+          <p:cNvPr id="12" name="TextBox 11">
+            <a:extLst>
+              <a:ext uri="{FF2B5EF4-FFF2-40B4-BE49-F238E27FC236}">
+                <a16:creationId xmlns:a16="http://schemas.microsoft.com/office/drawing/2014/main" id="{698BE9F2-07D8-4756-9BD2-CA4DB5C2C1EA}"/>
+              </a:ext>
+            </a:extLst>
+          </p:cNvPr>
+          <p:cNvSpPr txBox="1"/>
+          <p:nvPr/>
+        </p:nvSpPr>
+        <p:spPr>
+          <a:xfrm>
+            <a:off x="5864087" y="430696"/>
+            <a:ext cx="4147930" cy="923330"/>
+          </a:xfrm>
+          <a:prstGeom prst="rect">
+            <a:avLst/>
+          </a:prstGeom>
+          <a:noFill/>
+        </p:spPr>
+        <p:txBody>
+          <a:bodyPr wrap="square" rtlCol="0">
+            <a:spAutoFit/>
+          </a:bodyPr>
+          <a:lstStyle/>
+          <a:p>
+            <a:r>
+              <a:rPr lang="en-US" dirty="0">
+                <a:solidFill>
+                  <a:srgbClr val="FF0000"/>
+                </a:solidFill>
+              </a:rPr>
+              <a:t>I like those slides with the faded picture in the background. Can we try something like that?</a:t>
+            </a:r>
+          </a:p>
+        </p:txBody>
+      </p:sp>
     </p:spTree>
     <p:extLst>
       <p:ext uri="{BB962C8B-B14F-4D97-AF65-F5344CB8AC3E}">
@@ -4305,6 +5576,45 @@
           </a:p>
         </p:txBody>
       </p:sp>
+      <p:sp>
+        <p:nvSpPr>
+          <p:cNvPr id="4" name="TextBox 3">
+            <a:extLst>
+              <a:ext uri="{FF2B5EF4-FFF2-40B4-BE49-F238E27FC236}">
+                <a16:creationId xmlns:a16="http://schemas.microsoft.com/office/drawing/2014/main" id="{FB59B7D3-688A-49A8-A39D-4A0945A4CE35}"/>
+              </a:ext>
+            </a:extLst>
+          </p:cNvPr>
+          <p:cNvSpPr txBox="1"/>
+          <p:nvPr/>
+        </p:nvSpPr>
+        <p:spPr>
+          <a:xfrm>
+            <a:off x="5864087" y="430696"/>
+            <a:ext cx="4147930" cy="923330"/>
+          </a:xfrm>
+          <a:prstGeom prst="rect">
+            <a:avLst/>
+          </a:prstGeom>
+          <a:noFill/>
+        </p:spPr>
+        <p:txBody>
+          <a:bodyPr wrap="square" rtlCol="0">
+            <a:spAutoFit/>
+          </a:bodyPr>
+          <a:lstStyle/>
+          <a:p>
+            <a:r>
+              <a:rPr lang="en-US" dirty="0">
+                <a:solidFill>
+                  <a:srgbClr val="FF0000"/>
+                </a:solidFill>
+              </a:rPr>
+              <a:t>This is an embedded video. The text just describes the voice over and the [] give suggestions for the content.</a:t>
+            </a:r>
+          </a:p>
+        </p:txBody>
+      </p:sp>
     </p:spTree>
     <p:extLst>
       <p:ext uri="{BB962C8B-B14F-4D97-AF65-F5344CB8AC3E}">
@@ -4400,7 +5710,12 @@
             <p:ph type="title"/>
           </p:nvPr>
         </p:nvSpPr>
-        <p:spPr/>
+        <p:spPr>
+          <a:xfrm>
+            <a:off x="838200" y="338621"/>
+            <a:ext cx="10515600" cy="1325563"/>
+          </a:xfrm>
+        </p:spPr>
         <p:txBody>
           <a:bodyPr/>
           <a:lstStyle/>
@@ -5519,6 +6834,45 @@
             <a:r>
               <a:rPr lang="en-US" dirty="0"/>
               <a:t>To better serve your customers</a:t>
+            </a:r>
+          </a:p>
+        </p:txBody>
+      </p:sp>
+      <p:sp>
+        <p:nvSpPr>
+          <p:cNvPr id="29" name="TextBox 28">
+            <a:extLst>
+              <a:ext uri="{FF2B5EF4-FFF2-40B4-BE49-F238E27FC236}">
+                <a16:creationId xmlns:a16="http://schemas.microsoft.com/office/drawing/2014/main" id="{C8A8B21C-D6D9-436F-9421-2A1C8CFB6E2B}"/>
+              </a:ext>
+            </a:extLst>
+          </p:cNvPr>
+          <p:cNvSpPr txBox="1"/>
+          <p:nvPr/>
+        </p:nvSpPr>
+        <p:spPr>
+          <a:xfrm>
+            <a:off x="5864087" y="430696"/>
+            <a:ext cx="4147930" cy="646331"/>
+          </a:xfrm>
+          <a:prstGeom prst="rect">
+            <a:avLst/>
+          </a:prstGeom>
+          <a:noFill/>
+        </p:spPr>
+        <p:txBody>
+          <a:bodyPr wrap="square" rtlCol="0">
+            <a:spAutoFit/>
+          </a:bodyPr>
+          <a:lstStyle/>
+          <a:p>
+            <a:r>
+              <a:rPr lang="en-US" dirty="0">
+                <a:solidFill>
+                  <a:srgbClr val="FF0000"/>
+                </a:solidFill>
+              </a:rPr>
+              <a:t>Use Icons. Animate this showing the left side first, then the right side.</a:t>
             </a:r>
           </a:p>
         </p:txBody>
@@ -5596,7 +6950,7 @@
         <p:spPr>
           <a:xfrm>
             <a:off x="848344" y="1394285"/>
-            <a:ext cx="7175234" cy="369332"/>
+            <a:ext cx="7579704" cy="369332"/>
           </a:xfrm>
           <a:prstGeom prst="rect">
             <a:avLst/>
@@ -5611,7 +6965,7 @@
           <a:p>
             <a:r>
               <a:rPr lang="en-US" dirty="0"/>
-              <a:t>Lee is the best way to make personal connection without restricting access</a:t>
+              <a:t>Lee is the best way to make personal connection without pitching or marketing</a:t>
             </a:r>
           </a:p>
         </p:txBody>
@@ -5753,7 +7107,7 @@
           <a:p>
             <a:r>
               <a:rPr lang="en-US" dirty="0"/>
-              <a:t>impersonal</a:t>
+              <a:t>General</a:t>
             </a:r>
           </a:p>
         </p:txBody>
@@ -5773,7 +7127,7 @@
         <p:spPr>
           <a:xfrm>
             <a:off x="10176206" y="3661106"/>
-            <a:ext cx="1350050" cy="369332"/>
+            <a:ext cx="934871" cy="369332"/>
           </a:xfrm>
           <a:prstGeom prst="rect">
             <a:avLst/>
@@ -5788,7 +7142,7 @@
           <a:p>
             <a:r>
               <a:rPr lang="en-US" dirty="0"/>
-              <a:t>Open access</a:t>
+              <a:t>Support</a:t>
             </a:r>
           </a:p>
         </p:txBody>
@@ -5808,7 +7162,7 @@
         <p:spPr>
           <a:xfrm>
             <a:off x="577811" y="3781016"/>
-            <a:ext cx="1781770" cy="369332"/>
+            <a:ext cx="1991186" cy="369332"/>
           </a:xfrm>
           <a:prstGeom prst="rect">
             <a:avLst/>
@@ -5823,7 +7177,7 @@
           <a:p>
             <a:r>
               <a:rPr lang="en-US" dirty="0"/>
-              <a:t>Restricted access</a:t>
+              <a:t>Pitching/Marketing</a:t>
             </a:r>
           </a:p>
         </p:txBody>
@@ -6274,6 +7628,45 @@
                 </a:solidFill>
               </a:rPr>
               <a:t>Personalized advice from experts</a:t>
+            </a:r>
+          </a:p>
+        </p:txBody>
+      </p:sp>
+      <p:sp>
+        <p:nvSpPr>
+          <p:cNvPr id="23" name="TextBox 22">
+            <a:extLst>
+              <a:ext uri="{FF2B5EF4-FFF2-40B4-BE49-F238E27FC236}">
+                <a16:creationId xmlns:a16="http://schemas.microsoft.com/office/drawing/2014/main" id="{BD07FB79-58B4-44EE-93C5-540C94DEA6B4}"/>
+              </a:ext>
+            </a:extLst>
+          </p:cNvPr>
+          <p:cNvSpPr txBox="1"/>
+          <p:nvPr/>
+        </p:nvSpPr>
+        <p:spPr>
+          <a:xfrm>
+            <a:off x="5864087" y="430696"/>
+            <a:ext cx="4147930" cy="923330"/>
+          </a:xfrm>
+          <a:prstGeom prst="rect">
+            <a:avLst/>
+          </a:prstGeom>
+          <a:noFill/>
+        </p:spPr>
+        <p:txBody>
+          <a:bodyPr wrap="square" rtlCol="0">
+            <a:spAutoFit/>
+          </a:bodyPr>
+          <a:lstStyle/>
+          <a:p>
+            <a:r>
+              <a:rPr lang="en-US" dirty="0">
+                <a:solidFill>
+                  <a:srgbClr val="FF0000"/>
+                </a:solidFill>
+              </a:rPr>
+              <a:t>Reveal the competitors in an animation with Lee shown last. Use icons, but make ours the biggest.</a:t>
             </a:r>
           </a:p>
         </p:txBody>
@@ -6509,7 +7902,7 @@
           <p:nvPr/>
         </p:nvPicPr>
         <p:blipFill>
-          <a:blip r:embed="rId2">
+          <a:blip r:embed="rId3">
             <a:extLst>
               <a:ext uri="{28A0092B-C50C-407E-A947-70E740481C1C}">
                 <a14:useLocalDpi xmlns:a14="http://schemas.microsoft.com/office/drawing/2010/main" val="0"/>
@@ -7171,6 +8564,45 @@
               <a:t>of steps]</a:t>
             </a:r>
             <a:endParaRPr lang="en-US" dirty="0"/>
+          </a:p>
+        </p:txBody>
+      </p:sp>
+      <p:sp>
+        <p:nvSpPr>
+          <p:cNvPr id="3" name="TextBox 2">
+            <a:extLst>
+              <a:ext uri="{FF2B5EF4-FFF2-40B4-BE49-F238E27FC236}">
+                <a16:creationId xmlns:a16="http://schemas.microsoft.com/office/drawing/2014/main" id="{D0388801-5BC5-41E1-AA89-152332E68720}"/>
+              </a:ext>
+            </a:extLst>
+          </p:cNvPr>
+          <p:cNvSpPr txBox="1"/>
+          <p:nvPr/>
+        </p:nvSpPr>
+        <p:spPr>
+          <a:xfrm>
+            <a:off x="5864087" y="430696"/>
+            <a:ext cx="4147930" cy="646331"/>
+          </a:xfrm>
+          <a:prstGeom prst="rect">
+            <a:avLst/>
+          </a:prstGeom>
+          <a:noFill/>
+        </p:spPr>
+        <p:txBody>
+          <a:bodyPr wrap="square" rtlCol="0">
+            <a:spAutoFit/>
+          </a:bodyPr>
+          <a:lstStyle/>
+          <a:p>
+            <a:r>
+              <a:rPr lang="en-US" dirty="0">
+                <a:solidFill>
+                  <a:srgbClr val="FF0000"/>
+                </a:solidFill>
+              </a:rPr>
+              <a:t>Show an animation revealing the roadmap from start to finish.</a:t>
+            </a:r>
           </a:p>
         </p:txBody>
       </p:sp>
@@ -7480,4 +8912,299 @@
     </a:ext>
   </a:extLst>
 </a:theme>
+</file>
+
+<file path=ppt/theme/theme2.xml><?xml version="1.0" encoding="utf-8"?>
+<a:theme xmlns:a="http://schemas.openxmlformats.org/drawingml/2006/main" name="Office Theme">
+  <a:themeElements>
+    <a:clrScheme name="Office">
+      <a:dk1>
+        <a:sysClr val="windowText" lastClr="000000"/>
+      </a:dk1>
+      <a:lt1>
+        <a:sysClr val="window" lastClr="FFFFFF"/>
+      </a:lt1>
+      <a:dk2>
+        <a:srgbClr val="44546A"/>
+      </a:dk2>
+      <a:lt2>
+        <a:srgbClr val="E7E6E6"/>
+      </a:lt2>
+      <a:accent1>
+        <a:srgbClr val="4472C4"/>
+      </a:accent1>
+      <a:accent2>
+        <a:srgbClr val="ED7D31"/>
+      </a:accent2>
+      <a:accent3>
+        <a:srgbClr val="A5A5A5"/>
+      </a:accent3>
+      <a:accent4>
+        <a:srgbClr val="FFC000"/>
+      </a:accent4>
+      <a:accent5>
+        <a:srgbClr val="5B9BD5"/>
+      </a:accent5>
+      <a:accent6>
+        <a:srgbClr val="70AD47"/>
+      </a:accent6>
+      <a:hlink>
+        <a:srgbClr val="0563C1"/>
+      </a:hlink>
+      <a:folHlink>
+        <a:srgbClr val="954F72"/>
+      </a:folHlink>
+    </a:clrScheme>
+    <a:fontScheme name="Office">
+      <a:majorFont>
+        <a:latin typeface="Calibri Light" panose="020F0302020204030204"/>
+        <a:ea typeface=""/>
+        <a:cs typeface=""/>
+        <a:font script="Jpan" typeface="游ゴシック Light"/>
+        <a:font script="Hang" typeface="맑은 고딕"/>
+        <a:font script="Hans" typeface="等线 Light"/>
+        <a:font script="Hant" typeface="新細明體"/>
+        <a:font script="Arab" typeface="Times New Roman"/>
+        <a:font script="Hebr" typeface="Times New Roman"/>
+        <a:font script="Thai" typeface="Angsana New"/>
+        <a:font script="Ethi" typeface="Nyala"/>
+        <a:font script="Beng" typeface="Vrinda"/>
+        <a:font script="Gujr" typeface="Shruti"/>
+        <a:font script="Khmr" typeface="MoolBoran"/>
+        <a:font script="Knda" typeface="Tunga"/>
+        <a:font script="Guru" typeface="Raavi"/>
+        <a:font script="Cans" typeface="Euphemia"/>
+        <a:font script="Cher" typeface="Plantagenet Cherokee"/>
+        <a:font script="Yiii" typeface="Microsoft Yi Baiti"/>
+        <a:font script="Tibt" typeface="Microsoft Himalaya"/>
+        <a:font script="Thaa" typeface="MV Boli"/>
+        <a:font script="Deva" typeface="Mangal"/>
+        <a:font script="Telu" typeface="Gautami"/>
+        <a:font script="Taml" typeface="Latha"/>
+        <a:font script="Syrc" typeface="Estrangelo Edessa"/>
+        <a:font script="Orya" typeface="Kalinga"/>
+        <a:font script="Mlym" typeface="Kartika"/>
+        <a:font script="Laoo" typeface="DokChampa"/>
+        <a:font script="Sinh" typeface="Iskoola Pota"/>
+        <a:font script="Mong" typeface="Mongolian Baiti"/>
+        <a:font script="Viet" typeface="Times New Roman"/>
+        <a:font script="Uigh" typeface="Microsoft Uighur"/>
+        <a:font script="Geor" typeface="Sylfaen"/>
+        <a:font script="Armn" typeface="Arial"/>
+        <a:font script="Bugi" typeface="Leelawadee UI"/>
+        <a:font script="Bopo" typeface="Microsoft JhengHei"/>
+        <a:font script="Java" typeface="Javanese Text"/>
+        <a:font script="Lisu" typeface="Segoe UI"/>
+        <a:font script="Mymr" typeface="Myanmar Text"/>
+        <a:font script="Nkoo" typeface="Ebrima"/>
+        <a:font script="Olck" typeface="Nirmala UI"/>
+        <a:font script="Osma" typeface="Ebrima"/>
+        <a:font script="Phag" typeface="Phagspa"/>
+        <a:font script="Syrn" typeface="Estrangelo Edessa"/>
+        <a:font script="Syrj" typeface="Estrangelo Edessa"/>
+        <a:font script="Syre" typeface="Estrangelo Edessa"/>
+        <a:font script="Sora" typeface="Nirmala UI"/>
+        <a:font script="Tale" typeface="Microsoft Tai Le"/>
+        <a:font script="Talu" typeface="Microsoft New Tai Lue"/>
+        <a:font script="Tfng" typeface="Ebrima"/>
+      </a:majorFont>
+      <a:minorFont>
+        <a:latin typeface="Calibri" panose="020F0502020204030204"/>
+        <a:ea typeface=""/>
+        <a:cs typeface=""/>
+        <a:font script="Jpan" typeface="游ゴシック"/>
+        <a:font script="Hang" typeface="맑은 고딕"/>
+        <a:font script="Hans" typeface="等线"/>
+        <a:font script="Hant" typeface="新細明體"/>
+        <a:font script="Arab" typeface="Arial"/>
+        <a:font script="Hebr" typeface="Arial"/>
+        <a:font script="Thai" typeface="Cordia New"/>
+        <a:font script="Ethi" typeface="Nyala"/>
+        <a:font script="Beng" typeface="Vrinda"/>
+        <a:font script="Gujr" typeface="Shruti"/>
+        <a:font script="Khmr" typeface="DaunPenh"/>
+        <a:font script="Knda" typeface="Tunga"/>
+        <a:font script="Guru" typeface="Raavi"/>
+        <a:font script="Cans" typeface="Euphemia"/>
+        <a:font script="Cher" typeface="Plantagenet Cherokee"/>
+        <a:font script="Yiii" typeface="Microsoft Yi Baiti"/>
+        <a:font script="Tibt" typeface="Microsoft Himalaya"/>
+        <a:font script="Thaa" typeface="MV Boli"/>
+        <a:font script="Deva" typeface="Mangal"/>
+        <a:font script="Telu" typeface="Gautami"/>
+        <a:font script="Taml" typeface="Latha"/>
+        <a:font script="Syrc" typeface="Estrangelo Edessa"/>
+        <a:font script="Orya" typeface="Kalinga"/>
+        <a:font script="Mlym" typeface="Kartika"/>
+        <a:font script="Laoo" typeface="DokChampa"/>
+        <a:font script="Sinh" typeface="Iskoola Pota"/>
+        <a:font script="Mong" typeface="Mongolian Baiti"/>
+        <a:font script="Viet" typeface="Arial"/>
+        <a:font script="Uigh" typeface="Microsoft Uighur"/>
+        <a:font script="Geor" typeface="Sylfaen"/>
+        <a:font script="Armn" typeface="Arial"/>
+        <a:font script="Bugi" typeface="Leelawadee UI"/>
+        <a:font script="Bopo" typeface="Microsoft JhengHei"/>
+        <a:font script="Java" typeface="Javanese Text"/>
+        <a:font script="Lisu" typeface="Segoe UI"/>
+        <a:font script="Mymr" typeface="Myanmar Text"/>
+        <a:font script="Nkoo" typeface="Ebrima"/>
+        <a:font script="Olck" typeface="Nirmala UI"/>
+        <a:font script="Osma" typeface="Ebrima"/>
+        <a:font script="Phag" typeface="Phagspa"/>
+        <a:font script="Syrn" typeface="Estrangelo Edessa"/>
+        <a:font script="Syrj" typeface="Estrangelo Edessa"/>
+        <a:font script="Syre" typeface="Estrangelo Edessa"/>
+        <a:font script="Sora" typeface="Nirmala UI"/>
+        <a:font script="Tale" typeface="Microsoft Tai Le"/>
+        <a:font script="Talu" typeface="Microsoft New Tai Lue"/>
+        <a:font script="Tfng" typeface="Ebrima"/>
+      </a:minorFont>
+    </a:fontScheme>
+    <a:fmtScheme name="Office">
+      <a:fillStyleLst>
+        <a:solidFill>
+          <a:schemeClr val="phClr"/>
+        </a:solidFill>
+        <a:gradFill rotWithShape="1">
+          <a:gsLst>
+            <a:gs pos="0">
+              <a:schemeClr val="phClr">
+                <a:lumMod val="110000"/>
+                <a:satMod val="105000"/>
+                <a:tint val="67000"/>
+              </a:schemeClr>
+            </a:gs>
+            <a:gs pos="50000">
+              <a:schemeClr val="phClr">
+                <a:lumMod val="105000"/>
+                <a:satMod val="103000"/>
+                <a:tint val="73000"/>
+              </a:schemeClr>
+            </a:gs>
+            <a:gs pos="100000">
+              <a:schemeClr val="phClr">
+                <a:lumMod val="105000"/>
+                <a:satMod val="109000"/>
+                <a:tint val="81000"/>
+              </a:schemeClr>
+            </a:gs>
+          </a:gsLst>
+          <a:lin ang="5400000" scaled="0"/>
+        </a:gradFill>
+        <a:gradFill rotWithShape="1">
+          <a:gsLst>
+            <a:gs pos="0">
+              <a:schemeClr val="phClr">
+                <a:satMod val="103000"/>
+                <a:lumMod val="102000"/>
+                <a:tint val="94000"/>
+              </a:schemeClr>
+            </a:gs>
+            <a:gs pos="50000">
+              <a:schemeClr val="phClr">
+                <a:satMod val="110000"/>
+                <a:lumMod val="100000"/>
+                <a:shade val="100000"/>
+              </a:schemeClr>
+            </a:gs>
+            <a:gs pos="100000">
+              <a:schemeClr val="phClr">
+                <a:lumMod val="99000"/>
+                <a:satMod val="120000"/>
+                <a:shade val="78000"/>
+              </a:schemeClr>
+            </a:gs>
+          </a:gsLst>
+          <a:lin ang="5400000" scaled="0"/>
+        </a:gradFill>
+      </a:fillStyleLst>
+      <a:lnStyleLst>
+        <a:ln w="6350" cap="flat" cmpd="sng" algn="ctr">
+          <a:solidFill>
+            <a:schemeClr val="phClr"/>
+          </a:solidFill>
+          <a:prstDash val="solid"/>
+          <a:miter lim="800000"/>
+        </a:ln>
+        <a:ln w="12700" cap="flat" cmpd="sng" algn="ctr">
+          <a:solidFill>
+            <a:schemeClr val="phClr"/>
+          </a:solidFill>
+          <a:prstDash val="solid"/>
+          <a:miter lim="800000"/>
+        </a:ln>
+        <a:ln w="19050" cap="flat" cmpd="sng" algn="ctr">
+          <a:solidFill>
+            <a:schemeClr val="phClr"/>
+          </a:solidFill>
+          <a:prstDash val="solid"/>
+          <a:miter lim="800000"/>
+        </a:ln>
+      </a:lnStyleLst>
+      <a:effectStyleLst>
+        <a:effectStyle>
+          <a:effectLst/>
+        </a:effectStyle>
+        <a:effectStyle>
+          <a:effectLst/>
+        </a:effectStyle>
+        <a:effectStyle>
+          <a:effectLst>
+            <a:outerShdw blurRad="57150" dist="19050" dir="5400000" algn="ctr" rotWithShape="0">
+              <a:srgbClr val="000000">
+                <a:alpha val="63000"/>
+              </a:srgbClr>
+            </a:outerShdw>
+          </a:effectLst>
+        </a:effectStyle>
+      </a:effectStyleLst>
+      <a:bgFillStyleLst>
+        <a:solidFill>
+          <a:schemeClr val="phClr"/>
+        </a:solidFill>
+        <a:solidFill>
+          <a:schemeClr val="phClr">
+            <a:tint val="95000"/>
+            <a:satMod val="170000"/>
+          </a:schemeClr>
+        </a:solidFill>
+        <a:gradFill rotWithShape="1">
+          <a:gsLst>
+            <a:gs pos="0">
+              <a:schemeClr val="phClr">
+                <a:tint val="93000"/>
+                <a:satMod val="150000"/>
+                <a:shade val="98000"/>
+                <a:lumMod val="102000"/>
+              </a:schemeClr>
+            </a:gs>
+            <a:gs pos="50000">
+              <a:schemeClr val="phClr">
+                <a:tint val="98000"/>
+                <a:satMod val="130000"/>
+                <a:shade val="90000"/>
+                <a:lumMod val="103000"/>
+              </a:schemeClr>
+            </a:gs>
+            <a:gs pos="100000">
+              <a:schemeClr val="phClr">
+                <a:shade val="63000"/>
+                <a:satMod val="120000"/>
+              </a:schemeClr>
+            </a:gs>
+          </a:gsLst>
+          <a:lin ang="5400000" scaled="0"/>
+        </a:gradFill>
+      </a:bgFillStyleLst>
+    </a:fmtScheme>
+  </a:themeElements>
+  <a:objectDefaults/>
+  <a:extraClrSchemeLst/>
+  <a:extLst>
+    <a:ext uri="{05A4C25C-085E-4340-85A3-A5531E510DB2}">
+      <thm15:themeFamily xmlns:thm15="http://schemas.microsoft.com/office/thememl/2012/main" name="Office Theme" id="{62F939B6-93AF-4DB8-9C6B-D6C7DFDC589F}" vid="{4A3C46E8-61CC-4603-A589-7422A47A8E4A}"/>
+    </a:ext>
+  </a:extLst>
+</a:theme>
 </file>
</xml_diff>